<commit_message>
Added slides on visualising species occurrences
</commit_message>
<xml_diff>
--- a/SEECC_Coding.pptx
+++ b/SEECC_Coding.pptx
@@ -13,6 +13,7 @@
     <p:sldId id="261" r:id="rId7"/>
     <p:sldId id="260" r:id="rId8"/>
     <p:sldId id="263" r:id="rId9"/>
+    <p:sldId id="265" r:id="rId10"/>
   </p:sldIdLst>
   <p:sldSz cx="13536613" cy="6858000"/>
   <p:notesSz cx="6858000" cy="9144000"/>
@@ -173,7 +174,7 @@
           </a:lstStyle>
           <a:p>
             <a:r>
-              <a:rPr lang="en-US" smtClean="0"/>
+              <a:rPr lang="en-US"/>
               <a:t>Click to edit Master title style</a:t>
             </a:r>
             <a:endParaRPr lang="en-US" dirty="0"/>
@@ -238,7 +239,7 @@
           </a:lstStyle>
           <a:p>
             <a:r>
-              <a:rPr lang="en-US" smtClean="0"/>
+              <a:rPr lang="en-US"/>
               <a:t>Click to edit Master subtitle style</a:t>
             </a:r>
             <a:endParaRPr lang="en-US" dirty="0"/>
@@ -262,7 +263,7 @@
           <a:p>
             <a:fld id="{6CABAE2C-A9B2-44D4-9841-AA83B93BFA75}" type="datetimeFigureOut">
               <a:rPr lang="en-GB" smtClean="0"/>
-              <a:t>27/03/2017</a:t>
+              <a:t>01/04/2017</a:t>
             </a:fld>
             <a:endParaRPr lang="en-GB"/>
           </a:p>
@@ -356,7 +357,7 @@
           <a:lstStyle/>
           <a:p>
             <a:r>
-              <a:rPr lang="en-US" smtClean="0"/>
+              <a:rPr lang="en-US"/>
               <a:t>Click to edit Master title style</a:t>
             </a:r>
             <a:endParaRPr lang="en-US" dirty="0"/>
@@ -380,35 +381,35 @@
           <a:p>
             <a:pPr lvl="0"/>
             <a:r>
-              <a:rPr lang="en-US" smtClean="0"/>
+              <a:rPr lang="en-US"/>
               <a:t>Edit Master text styles</a:t>
             </a:r>
           </a:p>
           <a:p>
             <a:pPr lvl="1"/>
             <a:r>
-              <a:rPr lang="en-US" smtClean="0"/>
+              <a:rPr lang="en-US"/>
               <a:t>Second level</a:t>
             </a:r>
           </a:p>
           <a:p>
             <a:pPr lvl="2"/>
             <a:r>
-              <a:rPr lang="en-US" smtClean="0"/>
+              <a:rPr lang="en-US"/>
               <a:t>Third level</a:t>
             </a:r>
           </a:p>
           <a:p>
             <a:pPr lvl="3"/>
             <a:r>
-              <a:rPr lang="en-US" smtClean="0"/>
+              <a:rPr lang="en-US"/>
               <a:t>Fourth level</a:t>
             </a:r>
           </a:p>
           <a:p>
             <a:pPr lvl="4"/>
             <a:r>
-              <a:rPr lang="en-US" smtClean="0"/>
+              <a:rPr lang="en-US"/>
               <a:t>Fifth level</a:t>
             </a:r>
             <a:endParaRPr lang="en-US" dirty="0"/>
@@ -432,7 +433,7 @@
           <a:p>
             <a:fld id="{6CABAE2C-A9B2-44D4-9841-AA83B93BFA75}" type="datetimeFigureOut">
               <a:rPr lang="en-GB" smtClean="0"/>
-              <a:t>27/03/2017</a:t>
+              <a:t>01/04/2017</a:t>
             </a:fld>
             <a:endParaRPr lang="en-GB"/>
           </a:p>
@@ -531,7 +532,7 @@
           <a:lstStyle/>
           <a:p>
             <a:r>
-              <a:rPr lang="en-US" smtClean="0"/>
+              <a:rPr lang="en-US"/>
               <a:t>Click to edit Master title style</a:t>
             </a:r>
             <a:endParaRPr lang="en-US" dirty="0"/>
@@ -560,35 +561,35 @@
           <a:p>
             <a:pPr lvl="0"/>
             <a:r>
-              <a:rPr lang="en-US" smtClean="0"/>
+              <a:rPr lang="en-US"/>
               <a:t>Edit Master text styles</a:t>
             </a:r>
           </a:p>
           <a:p>
             <a:pPr lvl="1"/>
             <a:r>
-              <a:rPr lang="en-US" smtClean="0"/>
+              <a:rPr lang="en-US"/>
               <a:t>Second level</a:t>
             </a:r>
           </a:p>
           <a:p>
             <a:pPr lvl="2"/>
             <a:r>
-              <a:rPr lang="en-US" smtClean="0"/>
+              <a:rPr lang="en-US"/>
               <a:t>Third level</a:t>
             </a:r>
           </a:p>
           <a:p>
             <a:pPr lvl="3"/>
             <a:r>
-              <a:rPr lang="en-US" smtClean="0"/>
+              <a:rPr lang="en-US"/>
               <a:t>Fourth level</a:t>
             </a:r>
           </a:p>
           <a:p>
             <a:pPr lvl="4"/>
             <a:r>
-              <a:rPr lang="en-US" smtClean="0"/>
+              <a:rPr lang="en-US"/>
               <a:t>Fifth level</a:t>
             </a:r>
             <a:endParaRPr lang="en-US" dirty="0"/>
@@ -612,7 +613,7 @@
           <a:p>
             <a:fld id="{6CABAE2C-A9B2-44D4-9841-AA83B93BFA75}" type="datetimeFigureOut">
               <a:rPr lang="en-GB" smtClean="0"/>
-              <a:t>27/03/2017</a:t>
+              <a:t>01/04/2017</a:t>
             </a:fld>
             <a:endParaRPr lang="en-GB"/>
           </a:p>
@@ -706,7 +707,7 @@
           <a:lstStyle/>
           <a:p>
             <a:r>
-              <a:rPr lang="en-US" smtClean="0"/>
+              <a:rPr lang="en-US"/>
               <a:t>Click to edit Master title style</a:t>
             </a:r>
             <a:endParaRPr lang="en-US" dirty="0"/>
@@ -730,35 +731,35 @@
           <a:p>
             <a:pPr lvl="0"/>
             <a:r>
-              <a:rPr lang="en-US" smtClean="0"/>
+              <a:rPr lang="en-US"/>
               <a:t>Edit Master text styles</a:t>
             </a:r>
           </a:p>
           <a:p>
             <a:pPr lvl="1"/>
             <a:r>
-              <a:rPr lang="en-US" smtClean="0"/>
+              <a:rPr lang="en-US"/>
               <a:t>Second level</a:t>
             </a:r>
           </a:p>
           <a:p>
             <a:pPr lvl="2"/>
             <a:r>
-              <a:rPr lang="en-US" smtClean="0"/>
+              <a:rPr lang="en-US"/>
               <a:t>Third level</a:t>
             </a:r>
           </a:p>
           <a:p>
             <a:pPr lvl="3"/>
             <a:r>
-              <a:rPr lang="en-US" smtClean="0"/>
+              <a:rPr lang="en-US"/>
               <a:t>Fourth level</a:t>
             </a:r>
           </a:p>
           <a:p>
             <a:pPr lvl="4"/>
             <a:r>
-              <a:rPr lang="en-US" smtClean="0"/>
+              <a:rPr lang="en-US"/>
               <a:t>Fifth level</a:t>
             </a:r>
             <a:endParaRPr lang="en-US" dirty="0"/>
@@ -782,7 +783,7 @@
           <a:p>
             <a:fld id="{6CABAE2C-A9B2-44D4-9841-AA83B93BFA75}" type="datetimeFigureOut">
               <a:rPr lang="en-GB" smtClean="0"/>
-              <a:t>27/03/2017</a:t>
+              <a:t>01/04/2017</a:t>
             </a:fld>
             <a:endParaRPr lang="en-GB"/>
           </a:p>
@@ -885,7 +886,7 @@
           </a:lstStyle>
           <a:p>
             <a:r>
-              <a:rPr lang="en-US" smtClean="0"/>
+              <a:rPr lang="en-US"/>
               <a:t>Click to edit Master title style</a:t>
             </a:r>
             <a:endParaRPr lang="en-US" dirty="0"/>
@@ -1005,7 +1006,7 @@
           <a:p>
             <a:pPr lvl="0"/>
             <a:r>
-              <a:rPr lang="en-US" smtClean="0"/>
+              <a:rPr lang="en-US"/>
               <a:t>Edit Master text styles</a:t>
             </a:r>
           </a:p>
@@ -1028,7 +1029,7 @@
           <a:p>
             <a:fld id="{6CABAE2C-A9B2-44D4-9841-AA83B93BFA75}" type="datetimeFigureOut">
               <a:rPr lang="en-GB" smtClean="0"/>
-              <a:t>27/03/2017</a:t>
+              <a:t>01/04/2017</a:t>
             </a:fld>
             <a:endParaRPr lang="en-GB"/>
           </a:p>
@@ -1122,7 +1123,7 @@
           <a:lstStyle/>
           <a:p>
             <a:r>
-              <a:rPr lang="en-US" smtClean="0"/>
+              <a:rPr lang="en-US"/>
               <a:t>Click to edit Master title style</a:t>
             </a:r>
             <a:endParaRPr lang="en-US" dirty="0"/>
@@ -1151,35 +1152,35 @@
           <a:p>
             <a:pPr lvl="0"/>
             <a:r>
-              <a:rPr lang="en-US" smtClean="0"/>
+              <a:rPr lang="en-US"/>
               <a:t>Edit Master text styles</a:t>
             </a:r>
           </a:p>
           <a:p>
             <a:pPr lvl="1"/>
             <a:r>
-              <a:rPr lang="en-US" smtClean="0"/>
+              <a:rPr lang="en-US"/>
               <a:t>Second level</a:t>
             </a:r>
           </a:p>
           <a:p>
             <a:pPr lvl="2"/>
             <a:r>
-              <a:rPr lang="en-US" smtClean="0"/>
+              <a:rPr lang="en-US"/>
               <a:t>Third level</a:t>
             </a:r>
           </a:p>
           <a:p>
             <a:pPr lvl="3"/>
             <a:r>
-              <a:rPr lang="en-US" smtClean="0"/>
+              <a:rPr lang="en-US"/>
               <a:t>Fourth level</a:t>
             </a:r>
           </a:p>
           <a:p>
             <a:pPr lvl="4"/>
             <a:r>
-              <a:rPr lang="en-US" smtClean="0"/>
+              <a:rPr lang="en-US"/>
               <a:t>Fifth level</a:t>
             </a:r>
             <a:endParaRPr lang="en-US" dirty="0"/>
@@ -1208,35 +1209,35 @@
           <a:p>
             <a:pPr lvl="0"/>
             <a:r>
-              <a:rPr lang="en-US" smtClean="0"/>
+              <a:rPr lang="en-US"/>
               <a:t>Edit Master text styles</a:t>
             </a:r>
           </a:p>
           <a:p>
             <a:pPr lvl="1"/>
             <a:r>
-              <a:rPr lang="en-US" smtClean="0"/>
+              <a:rPr lang="en-US"/>
               <a:t>Second level</a:t>
             </a:r>
           </a:p>
           <a:p>
             <a:pPr lvl="2"/>
             <a:r>
-              <a:rPr lang="en-US" smtClean="0"/>
+              <a:rPr lang="en-US"/>
               <a:t>Third level</a:t>
             </a:r>
           </a:p>
           <a:p>
             <a:pPr lvl="3"/>
             <a:r>
-              <a:rPr lang="en-US" smtClean="0"/>
+              <a:rPr lang="en-US"/>
               <a:t>Fourth level</a:t>
             </a:r>
           </a:p>
           <a:p>
             <a:pPr lvl="4"/>
             <a:r>
-              <a:rPr lang="en-US" smtClean="0"/>
+              <a:rPr lang="en-US"/>
               <a:t>Fifth level</a:t>
             </a:r>
             <a:endParaRPr lang="en-US" dirty="0"/>
@@ -1260,7 +1261,7 @@
           <a:p>
             <a:fld id="{6CABAE2C-A9B2-44D4-9841-AA83B93BFA75}" type="datetimeFigureOut">
               <a:rPr lang="en-GB" smtClean="0"/>
-              <a:t>27/03/2017</a:t>
+              <a:t>01/04/2017</a:t>
             </a:fld>
             <a:endParaRPr lang="en-GB"/>
           </a:p>
@@ -1359,7 +1360,7 @@
           <a:lstStyle/>
           <a:p>
             <a:r>
-              <a:rPr lang="en-US" smtClean="0"/>
+              <a:rPr lang="en-US"/>
               <a:t>Click to edit Master title style</a:t>
             </a:r>
             <a:endParaRPr lang="en-US" dirty="0"/>
@@ -1425,7 +1426,7 @@
           <a:p>
             <a:pPr lvl="0"/>
             <a:r>
-              <a:rPr lang="en-US" smtClean="0"/>
+              <a:rPr lang="en-US"/>
               <a:t>Edit Master text styles</a:t>
             </a:r>
           </a:p>
@@ -1453,35 +1454,35 @@
           <a:p>
             <a:pPr lvl="0"/>
             <a:r>
-              <a:rPr lang="en-US" smtClean="0"/>
+              <a:rPr lang="en-US"/>
               <a:t>Edit Master text styles</a:t>
             </a:r>
           </a:p>
           <a:p>
             <a:pPr lvl="1"/>
             <a:r>
-              <a:rPr lang="en-US" smtClean="0"/>
+              <a:rPr lang="en-US"/>
               <a:t>Second level</a:t>
             </a:r>
           </a:p>
           <a:p>
             <a:pPr lvl="2"/>
             <a:r>
-              <a:rPr lang="en-US" smtClean="0"/>
+              <a:rPr lang="en-US"/>
               <a:t>Third level</a:t>
             </a:r>
           </a:p>
           <a:p>
             <a:pPr lvl="3"/>
             <a:r>
-              <a:rPr lang="en-US" smtClean="0"/>
+              <a:rPr lang="en-US"/>
               <a:t>Fourth level</a:t>
             </a:r>
           </a:p>
           <a:p>
             <a:pPr lvl="4"/>
             <a:r>
-              <a:rPr lang="en-US" smtClean="0"/>
+              <a:rPr lang="en-US"/>
               <a:t>Fifth level</a:t>
             </a:r>
             <a:endParaRPr lang="en-US" dirty="0"/>
@@ -1547,7 +1548,7 @@
           <a:p>
             <a:pPr lvl="0"/>
             <a:r>
-              <a:rPr lang="en-US" smtClean="0"/>
+              <a:rPr lang="en-US"/>
               <a:t>Edit Master text styles</a:t>
             </a:r>
           </a:p>
@@ -1575,35 +1576,35 @@
           <a:p>
             <a:pPr lvl="0"/>
             <a:r>
-              <a:rPr lang="en-US" smtClean="0"/>
+              <a:rPr lang="en-US"/>
               <a:t>Edit Master text styles</a:t>
             </a:r>
           </a:p>
           <a:p>
             <a:pPr lvl="1"/>
             <a:r>
-              <a:rPr lang="en-US" smtClean="0"/>
+              <a:rPr lang="en-US"/>
               <a:t>Second level</a:t>
             </a:r>
           </a:p>
           <a:p>
             <a:pPr lvl="2"/>
             <a:r>
-              <a:rPr lang="en-US" smtClean="0"/>
+              <a:rPr lang="en-US"/>
               <a:t>Third level</a:t>
             </a:r>
           </a:p>
           <a:p>
             <a:pPr lvl="3"/>
             <a:r>
-              <a:rPr lang="en-US" smtClean="0"/>
+              <a:rPr lang="en-US"/>
               <a:t>Fourth level</a:t>
             </a:r>
           </a:p>
           <a:p>
             <a:pPr lvl="4"/>
             <a:r>
-              <a:rPr lang="en-US" smtClean="0"/>
+              <a:rPr lang="en-US"/>
               <a:t>Fifth level</a:t>
             </a:r>
             <a:endParaRPr lang="en-US" dirty="0"/>
@@ -1627,7 +1628,7 @@
           <a:p>
             <a:fld id="{6CABAE2C-A9B2-44D4-9841-AA83B93BFA75}" type="datetimeFigureOut">
               <a:rPr lang="en-GB" smtClean="0"/>
-              <a:t>27/03/2017</a:t>
+              <a:t>01/04/2017</a:t>
             </a:fld>
             <a:endParaRPr lang="en-GB"/>
           </a:p>
@@ -1721,7 +1722,7 @@
           <a:lstStyle/>
           <a:p>
             <a:r>
-              <a:rPr lang="en-US" smtClean="0"/>
+              <a:rPr lang="en-US"/>
               <a:t>Click to edit Master title style</a:t>
             </a:r>
             <a:endParaRPr lang="en-US" dirty="0"/>
@@ -1745,7 +1746,7 @@
           <a:p>
             <a:fld id="{6CABAE2C-A9B2-44D4-9841-AA83B93BFA75}" type="datetimeFigureOut">
               <a:rPr lang="en-GB" smtClean="0"/>
-              <a:t>27/03/2017</a:t>
+              <a:t>01/04/2017</a:t>
             </a:fld>
             <a:endParaRPr lang="en-GB"/>
           </a:p>
@@ -1840,7 +1841,7 @@
           <a:p>
             <a:fld id="{6CABAE2C-A9B2-44D4-9841-AA83B93BFA75}" type="datetimeFigureOut">
               <a:rPr lang="en-GB" smtClean="0"/>
-              <a:t>27/03/2017</a:t>
+              <a:t>01/04/2017</a:t>
             </a:fld>
             <a:endParaRPr lang="en-GB"/>
           </a:p>
@@ -1943,7 +1944,7 @@
           </a:lstStyle>
           <a:p>
             <a:r>
-              <a:rPr lang="en-US" smtClean="0"/>
+              <a:rPr lang="en-US"/>
               <a:t>Click to edit Master title style</a:t>
             </a:r>
             <a:endParaRPr lang="en-US" dirty="0"/>
@@ -2000,35 +2001,35 @@
           <a:p>
             <a:pPr lvl="0"/>
             <a:r>
-              <a:rPr lang="en-US" smtClean="0"/>
+              <a:rPr lang="en-US"/>
               <a:t>Edit Master text styles</a:t>
             </a:r>
           </a:p>
           <a:p>
             <a:pPr lvl="1"/>
             <a:r>
-              <a:rPr lang="en-US" smtClean="0"/>
+              <a:rPr lang="en-US"/>
               <a:t>Second level</a:t>
             </a:r>
           </a:p>
           <a:p>
             <a:pPr lvl="2"/>
             <a:r>
-              <a:rPr lang="en-US" smtClean="0"/>
+              <a:rPr lang="en-US"/>
               <a:t>Third level</a:t>
             </a:r>
           </a:p>
           <a:p>
             <a:pPr lvl="3"/>
             <a:r>
-              <a:rPr lang="en-US" smtClean="0"/>
+              <a:rPr lang="en-US"/>
               <a:t>Fourth level</a:t>
             </a:r>
           </a:p>
           <a:p>
             <a:pPr lvl="4"/>
             <a:r>
-              <a:rPr lang="en-US" smtClean="0"/>
+              <a:rPr lang="en-US"/>
               <a:t>Fifth level</a:t>
             </a:r>
             <a:endParaRPr lang="en-US" dirty="0"/>
@@ -2094,7 +2095,7 @@
           <a:p>
             <a:pPr lvl="0"/>
             <a:r>
-              <a:rPr lang="en-US" smtClean="0"/>
+              <a:rPr lang="en-US"/>
               <a:t>Edit Master text styles</a:t>
             </a:r>
           </a:p>
@@ -2117,7 +2118,7 @@
           <a:p>
             <a:fld id="{6CABAE2C-A9B2-44D4-9841-AA83B93BFA75}" type="datetimeFigureOut">
               <a:rPr lang="en-GB" smtClean="0"/>
-              <a:t>27/03/2017</a:t>
+              <a:t>01/04/2017</a:t>
             </a:fld>
             <a:endParaRPr lang="en-GB"/>
           </a:p>
@@ -2220,7 +2221,7 @@
           </a:lstStyle>
           <a:p>
             <a:r>
-              <a:rPr lang="en-US" smtClean="0"/>
+              <a:rPr lang="en-US"/>
               <a:t>Click to edit Master title style</a:t>
             </a:r>
             <a:endParaRPr lang="en-US" dirty="0"/>
@@ -2285,7 +2286,7 @@
           </a:lstStyle>
           <a:p>
             <a:r>
-              <a:rPr lang="en-US" smtClean="0"/>
+              <a:rPr lang="en-US"/>
               <a:t>Click icon to add picture</a:t>
             </a:r>
             <a:endParaRPr lang="en-US" dirty="0"/>
@@ -2351,7 +2352,7 @@
           <a:p>
             <a:pPr lvl="0"/>
             <a:r>
-              <a:rPr lang="en-US" smtClean="0"/>
+              <a:rPr lang="en-US"/>
               <a:t>Edit Master text styles</a:t>
             </a:r>
           </a:p>
@@ -2374,7 +2375,7 @@
           <a:p>
             <a:fld id="{6CABAE2C-A9B2-44D4-9841-AA83B93BFA75}" type="datetimeFigureOut">
               <a:rPr lang="en-GB" smtClean="0"/>
-              <a:t>27/03/2017</a:t>
+              <a:t>01/04/2017</a:t>
             </a:fld>
             <a:endParaRPr lang="en-GB"/>
           </a:p>
@@ -2483,7 +2484,7 @@
           <a:lstStyle/>
           <a:p>
             <a:r>
-              <a:rPr lang="en-US" smtClean="0"/>
+              <a:rPr lang="en-US"/>
               <a:t>Click to edit Master title style</a:t>
             </a:r>
             <a:endParaRPr lang="en-US" dirty="0"/>
@@ -2517,35 +2518,35 @@
           <a:p>
             <a:pPr lvl="0"/>
             <a:r>
-              <a:rPr lang="en-US" smtClean="0"/>
+              <a:rPr lang="en-US"/>
               <a:t>Edit Master text styles</a:t>
             </a:r>
           </a:p>
           <a:p>
             <a:pPr lvl="1"/>
             <a:r>
-              <a:rPr lang="en-US" smtClean="0"/>
+              <a:rPr lang="en-US"/>
               <a:t>Second level</a:t>
             </a:r>
           </a:p>
           <a:p>
             <a:pPr lvl="2"/>
             <a:r>
-              <a:rPr lang="en-US" smtClean="0"/>
+              <a:rPr lang="en-US"/>
               <a:t>Third level</a:t>
             </a:r>
           </a:p>
           <a:p>
             <a:pPr lvl="3"/>
             <a:r>
-              <a:rPr lang="en-US" smtClean="0"/>
+              <a:rPr lang="en-US"/>
               <a:t>Fourth level</a:t>
             </a:r>
           </a:p>
           <a:p>
             <a:pPr lvl="4"/>
             <a:r>
-              <a:rPr lang="en-US" smtClean="0"/>
+              <a:rPr lang="en-US"/>
               <a:t>Fifth level</a:t>
             </a:r>
             <a:endParaRPr lang="en-US" dirty="0"/>
@@ -2587,7 +2588,7 @@
           <a:p>
             <a:fld id="{6CABAE2C-A9B2-44D4-9841-AA83B93BFA75}" type="datetimeFigureOut">
               <a:rPr lang="en-GB" smtClean="0"/>
-              <a:t>27/03/2017</a:t>
+              <a:t>01/04/2017</a:t>
             </a:fld>
             <a:endParaRPr lang="en-GB"/>
           </a:p>
@@ -3136,7 +3137,7 @@
           <a:p>
             <a:pPr algn="ctr"/>
             <a:r>
-              <a:rPr lang="en-US" sz="3200" dirty="0" smtClean="0">
+              <a:rPr lang="en-US" sz="3200" dirty="0">
                 <a:solidFill>
                   <a:schemeClr val="bg1"/>
                 </a:solidFill>
@@ -3149,7 +3150,7 @@
           <a:p>
             <a:pPr algn="ctr"/>
             <a:r>
-              <a:rPr lang="en-US" sz="3200" dirty="0" smtClean="0">
+              <a:rPr lang="en-US" sz="3200" dirty="0">
                 <a:solidFill>
                   <a:schemeClr val="bg1"/>
                 </a:solidFill>
@@ -3159,7 +3160,7 @@
               <a:t>John </a:t>
             </a:r>
             <a:r>
-              <a:rPr lang="en-US" sz="3200" dirty="0" err="1" smtClean="0">
+              <a:rPr lang="en-US" sz="3200" dirty="0" err="1">
                 <a:solidFill>
                   <a:schemeClr val="bg1"/>
                 </a:solidFill>
@@ -3169,7 +3170,7 @@
               <a:t>Godlee</a:t>
             </a:r>
             <a:r>
-              <a:rPr lang="en-US" sz="3200" dirty="0" smtClean="0">
+              <a:rPr lang="en-US" sz="3200" dirty="0">
                 <a:solidFill>
                   <a:schemeClr val="bg1"/>
                 </a:solidFill>
@@ -3179,7 +3180,7 @@
               <a:t>, Sandra Angers-</a:t>
             </a:r>
             <a:r>
-              <a:rPr lang="en-US" sz="3200" dirty="0" err="1" smtClean="0">
+              <a:rPr lang="en-US" sz="3200" dirty="0" err="1">
                 <a:solidFill>
                   <a:schemeClr val="bg1"/>
                 </a:solidFill>
@@ -3188,7 +3189,7 @@
               </a:rPr>
               <a:t>Blondin</a:t>
             </a:r>
-            <a:endParaRPr lang="en-US" sz="3200" dirty="0" smtClean="0">
+            <a:endParaRPr lang="en-US" sz="3200" dirty="0">
               <a:solidFill>
                 <a:schemeClr val="bg1"/>
               </a:solidFill>
@@ -3199,7 +3200,7 @@
           <a:p>
             <a:pPr algn="ctr"/>
             <a:r>
-              <a:rPr lang="en-US" sz="3200" dirty="0" smtClean="0">
+              <a:rPr lang="en-US" sz="3200" dirty="0">
                 <a:solidFill>
                   <a:schemeClr val="bg1"/>
                 </a:solidFill>
@@ -3318,7 +3319,7 @@
           <a:p>
             <a:pPr algn="ctr"/>
             <a:r>
-              <a:rPr lang="en-US" sz="5400" b="1" dirty="0" smtClean="0">
+              <a:rPr lang="en-US" sz="5400" b="1" dirty="0">
                 <a:solidFill>
                   <a:schemeClr val="bg1"/>
                 </a:solidFill>
@@ -3328,7 +3329,7 @@
               <a:t>Quantifying population change and </a:t>
             </a:r>
             <a:r>
-              <a:rPr lang="en-US" sz="5400" b="1" dirty="0" err="1" smtClean="0">
+              <a:rPr lang="en-US" sz="5400" b="1" dirty="0" err="1">
                 <a:solidFill>
                   <a:schemeClr val="bg1"/>
                 </a:solidFill>
@@ -3338,7 +3339,7 @@
               <a:t>visualising</a:t>
             </a:r>
             <a:r>
-              <a:rPr lang="en-US" sz="5400" b="1" dirty="0" smtClean="0">
+              <a:rPr lang="en-US" sz="5400" b="1" dirty="0">
                 <a:solidFill>
                   <a:schemeClr val="bg1"/>
                 </a:solidFill>
@@ -3367,13 +3368,6 @@
   <p:clrMapOvr>
     <a:masterClrMapping/>
   </p:clrMapOvr>
-  <p:timing>
-    <p:tnLst>
-      <p:par>
-        <p:cTn id="1" dur="indefinite" restart="never" nodeType="tmRoot"/>
-      </p:par>
-    </p:tnLst>
-  </p:timing>
 </p:sld>
 </file>
 
@@ -3486,7 +3480,7 @@
           <a:lstStyle/>
           <a:p>
             <a:r>
-              <a:rPr lang="en-US" sz="4400" b="1" dirty="0" smtClean="0">
+              <a:rPr lang="en-US" sz="4400" b="1" dirty="0">
                 <a:latin typeface="Arial" panose="020B0604020202020204" pitchFamily="34" charset="0"/>
                 <a:cs typeface="Arial" panose="020B0604020202020204" pitchFamily="34" charset="0"/>
               </a:rPr>
@@ -3585,13 +3579,6 @@
   <p:clrMapOvr>
     <a:masterClrMapping/>
   </p:clrMapOvr>
-  <p:timing>
-    <p:tnLst>
-      <p:par>
-        <p:cTn id="1" dur="indefinite" restart="never" nodeType="tmRoot"/>
-      </p:par>
-    </p:tnLst>
-  </p:timing>
 </p:sld>
 </file>
 
@@ -4697,7 +4684,7 @@
           <a:lstStyle/>
           <a:p>
             <a:r>
-              <a:rPr lang="en-US" sz="11500" b="1" dirty="0" err="1" smtClean="0">
+              <a:rPr lang="en-US" sz="11500" b="1" dirty="0" err="1">
                 <a:ln>
                   <a:solidFill>
                     <a:schemeClr val="tx1"/>
@@ -5037,7 +5024,7 @@
           <a:lstStyle/>
           <a:p>
             <a:r>
-              <a:rPr lang="en-US" sz="4400" b="1" dirty="0" smtClean="0">
+              <a:rPr lang="en-US" sz="4400" b="1" dirty="0">
                 <a:latin typeface="Arial" panose="020B0604020202020204" pitchFamily="34" charset="0"/>
                 <a:cs typeface="Arial" panose="020B0604020202020204" pitchFamily="34" charset="0"/>
               </a:rPr>
@@ -5163,7 +5150,7 @@
           <a:p>
             <a:pPr algn="ctr"/>
             <a:r>
-              <a:rPr lang="en-US" sz="5400" b="1" dirty="0" smtClean="0">
+              <a:rPr lang="en-US" sz="5400" b="1" dirty="0">
                 <a:solidFill>
                   <a:srgbClr val="155253"/>
                 </a:solidFill>
@@ -5504,21 +5491,21 @@
           <a:lstStyle/>
           <a:p>
             <a:r>
-              <a:rPr lang="en-US" sz="3600" b="1" dirty="0" err="1" smtClean="0">
+              <a:rPr lang="en-US" sz="3600" b="1" dirty="0" err="1">
                 <a:latin typeface="Arial" panose="020B0604020202020204" pitchFamily="34" charset="0"/>
                 <a:cs typeface="Arial" panose="020B0604020202020204" pitchFamily="34" charset="0"/>
               </a:rPr>
               <a:t>Visualising</a:t>
             </a:r>
             <a:r>
-              <a:rPr lang="en-US" sz="3600" b="1" dirty="0" smtClean="0">
+              <a:rPr lang="en-US" sz="3600" b="1" dirty="0">
                 <a:latin typeface="Arial" panose="020B0604020202020204" pitchFamily="34" charset="0"/>
                 <a:cs typeface="Arial" panose="020B0604020202020204" pitchFamily="34" charset="0"/>
               </a:rPr>
               <a:t> species occurrence </a:t>
             </a:r>
             <a:r>
-              <a:rPr lang="en-US" sz="3600" dirty="0" smtClean="0">
+              <a:rPr lang="en-US" sz="3600" dirty="0">
                 <a:latin typeface="Arial" panose="020B0604020202020204" pitchFamily="34" charset="0"/>
                 <a:cs typeface="Arial" panose="020B0604020202020204" pitchFamily="34" charset="0"/>
               </a:rPr>
@@ -5531,6 +5518,124 @@
           </a:p>
         </p:txBody>
       </p:sp>
+      <p:pic>
+        <p:nvPicPr>
+          <p:cNvPr id="6" name="Picture 5"/>
+          <p:cNvPicPr>
+            <a:picLocks noChangeAspect="1"/>
+          </p:cNvPicPr>
+          <p:nvPr/>
+        </p:nvPicPr>
+        <p:blipFill>
+          <a:blip r:embed="rId3">
+            <a:extLst>
+              <a:ext uri="{28A0092B-C50C-407E-A947-70E740481C1C}">
+                <a14:useLocalDpi xmlns:a14="http://schemas.microsoft.com/office/drawing/2010/main" val="0"/>
+              </a:ext>
+            </a:extLst>
+          </a:blip>
+          <a:stretch>
+            <a:fillRect/>
+          </a:stretch>
+        </p:blipFill>
+        <p:spPr>
+          <a:xfrm>
+            <a:off x="144935" y="1819200"/>
+            <a:ext cx="5263370" cy="2536944"/>
+          </a:xfrm>
+          <a:prstGeom prst="rect">
+            <a:avLst/>
+          </a:prstGeom>
+        </p:spPr>
+      </p:pic>
+      <p:pic>
+        <p:nvPicPr>
+          <p:cNvPr id="8" name="Picture 7"/>
+          <p:cNvPicPr>
+            <a:picLocks noChangeAspect="1"/>
+          </p:cNvPicPr>
+          <p:nvPr/>
+        </p:nvPicPr>
+        <p:blipFill>
+          <a:blip r:embed="rId4">
+            <a:extLst>
+              <a:ext uri="{28A0092B-C50C-407E-A947-70E740481C1C}">
+                <a14:useLocalDpi xmlns:a14="http://schemas.microsoft.com/office/drawing/2010/main" val="0"/>
+              </a:ext>
+            </a:extLst>
+          </a:blip>
+          <a:stretch>
+            <a:fillRect/>
+          </a:stretch>
+        </p:blipFill>
+        <p:spPr>
+          <a:xfrm>
+            <a:off x="561373" y="4858247"/>
+            <a:ext cx="4720244" cy="1432594"/>
+          </a:xfrm>
+          <a:prstGeom prst="rect">
+            <a:avLst/>
+          </a:prstGeom>
+        </p:spPr>
+      </p:pic>
+      <p:pic>
+        <p:nvPicPr>
+          <p:cNvPr id="10" name="Picture 9"/>
+          <p:cNvPicPr>
+            <a:picLocks noChangeAspect="1"/>
+          </p:cNvPicPr>
+          <p:nvPr/>
+        </p:nvPicPr>
+        <p:blipFill rotWithShape="1">
+          <a:blip r:embed="rId5">
+            <a:extLst>
+              <a:ext uri="{28A0092B-C50C-407E-A947-70E740481C1C}">
+                <a14:useLocalDpi xmlns:a14="http://schemas.microsoft.com/office/drawing/2010/main" val="0"/>
+              </a:ext>
+            </a:extLst>
+          </a:blip>
+          <a:srcRect l="40169" t="17403" r="17805" b="15298"/>
+          <a:stretch/>
+        </p:blipFill>
+        <p:spPr>
+          <a:xfrm>
+            <a:off x="7613016" y="1177257"/>
+            <a:ext cx="3159890" cy="5507122"/>
+          </a:xfrm>
+          <a:prstGeom prst="rect">
+            <a:avLst/>
+          </a:prstGeom>
+        </p:spPr>
+      </p:pic>
+      <p:pic>
+        <p:nvPicPr>
+          <p:cNvPr id="14" name="Picture 13"/>
+          <p:cNvPicPr>
+            <a:picLocks noChangeAspect="1"/>
+          </p:cNvPicPr>
+          <p:nvPr/>
+        </p:nvPicPr>
+        <p:blipFill rotWithShape="1">
+          <a:blip r:embed="rId6">
+            <a:extLst>
+              <a:ext uri="{28A0092B-C50C-407E-A947-70E740481C1C}">
+                <a14:useLocalDpi xmlns:a14="http://schemas.microsoft.com/office/drawing/2010/main" val="0"/>
+              </a:ext>
+            </a:extLst>
+          </a:blip>
+          <a:srcRect l="35013"/>
+          <a:stretch/>
+        </p:blipFill>
+        <p:spPr>
+          <a:xfrm>
+            <a:off x="11571407" y="1471083"/>
+            <a:ext cx="1654735" cy="1698826"/>
+          </a:xfrm>
+          <a:prstGeom prst="rect">
+            <a:avLst/>
+          </a:prstGeom>
+        </p:spPr>
+      </p:pic>
     </p:spTree>
     <p:extLst>
       <p:ext uri="{BB962C8B-B14F-4D97-AF65-F5344CB8AC3E}">
@@ -5541,13 +5646,6 @@
   <p:clrMapOvr>
     <a:masterClrMapping/>
   </p:clrMapOvr>
-  <p:timing>
-    <p:tnLst>
-      <p:par>
-        <p:cTn id="1" dur="indefinite" restart="never" nodeType="tmRoot"/>
-      </p:par>
-    </p:tnLst>
-  </p:timing>
 </p:sld>
 </file>
 
@@ -5766,13 +5864,6 @@
   <p:clrMapOvr>
     <a:masterClrMapping/>
   </p:clrMapOvr>
-  <p:timing>
-    <p:tnLst>
-      <p:par>
-        <p:cTn id="1" dur="indefinite" restart="never" nodeType="tmRoot"/>
-      </p:par>
-    </p:tnLst>
-  </p:timing>
 </p:sld>
 </file>
 
@@ -5922,14 +6013,14 @@
           <a:lstStyle/>
           <a:p>
             <a:r>
-              <a:rPr lang="en-US" sz="4400" b="1" dirty="0" smtClean="0">
+              <a:rPr lang="en-US" sz="4400" b="1" dirty="0">
                 <a:latin typeface="Arial" panose="020B0604020202020204" pitchFamily="34" charset="0"/>
                 <a:cs typeface="Arial" panose="020B0604020202020204" pitchFamily="34" charset="0"/>
               </a:rPr>
               <a:t>Results </a:t>
             </a:r>
             <a:r>
-              <a:rPr lang="en-US" sz="4400" dirty="0" smtClean="0">
+              <a:rPr lang="en-US" sz="4400" dirty="0">
                 <a:latin typeface="Arial" panose="020B0604020202020204" pitchFamily="34" charset="0"/>
                 <a:cs typeface="Arial" panose="020B0604020202020204" pitchFamily="34" charset="0"/>
               </a:rPr>
@@ -5952,13 +6043,6 @@
   <p:clrMapOvr>
     <a:masterClrMapping/>
   </p:clrMapOvr>
-  <p:timing>
-    <p:tnLst>
-      <p:par>
-        <p:cTn id="1" dur="indefinite" restart="never" nodeType="tmRoot"/>
-      </p:par>
-    </p:tnLst>
-  </p:timing>
 </p:sld>
 </file>
 
@@ -6078,14 +6162,14 @@
           <a:lstStyle/>
           <a:p>
             <a:r>
-              <a:rPr lang="en-US" sz="4400" b="1" dirty="0" smtClean="0">
+              <a:rPr lang="en-US" sz="4400" b="1" dirty="0">
                 <a:latin typeface="Arial" panose="020B0604020202020204" pitchFamily="34" charset="0"/>
                 <a:cs typeface="Arial" panose="020B0604020202020204" pitchFamily="34" charset="0"/>
               </a:rPr>
               <a:t>Results </a:t>
             </a:r>
             <a:r>
-              <a:rPr lang="en-US" sz="4400" dirty="0" smtClean="0">
+              <a:rPr lang="en-US" sz="4400" dirty="0">
                 <a:latin typeface="Arial" panose="020B0604020202020204" pitchFamily="34" charset="0"/>
                 <a:cs typeface="Arial" panose="020B0604020202020204" pitchFamily="34" charset="0"/>
               </a:rPr>
@@ -6098,36 +6182,64 @@
           </a:p>
         </p:txBody>
       </p:sp>
-      <p:sp>
-        <p:nvSpPr>
-          <p:cNvPr id="6" name="TextBox 5"/>
-          <p:cNvSpPr txBox="1"/>
-          <p:nvPr/>
-        </p:nvSpPr>
-        <p:spPr>
-          <a:xfrm>
-            <a:off x="3243943" y="2808514"/>
-            <a:ext cx="8871857" cy="369332"/>
-          </a:xfrm>
-          <a:prstGeom prst="rect">
-            <a:avLst/>
-          </a:prstGeom>
-          <a:noFill/>
-        </p:spPr>
-        <p:txBody>
-          <a:bodyPr wrap="square" rtlCol="0">
-            <a:spAutoFit/>
-          </a:bodyPr>
-          <a:lstStyle/>
-          <a:p>
-            <a:r>
-              <a:rPr lang="en-US" dirty="0" smtClean="0"/>
-              <a:t>Results of density maps based on GBIF vs Flickr?</a:t>
-            </a:r>
-            <a:endParaRPr lang="bg-BG" dirty="0"/>
-          </a:p>
-        </p:txBody>
-      </p:sp>
+      <p:pic>
+        <p:nvPicPr>
+          <p:cNvPr id="7" name="Picture 6"/>
+          <p:cNvPicPr>
+            <a:picLocks noChangeAspect="1"/>
+          </p:cNvPicPr>
+          <p:nvPr/>
+        </p:nvPicPr>
+        <p:blipFill rotWithShape="1">
+          <a:blip r:embed="rId3">
+            <a:extLst>
+              <a:ext uri="{28A0092B-C50C-407E-A947-70E740481C1C}">
+                <a14:useLocalDpi xmlns:a14="http://schemas.microsoft.com/office/drawing/2010/main" val="0"/>
+              </a:ext>
+            </a:extLst>
+          </a:blip>
+          <a:srcRect b="2586"/>
+          <a:stretch/>
+        </p:blipFill>
+        <p:spPr>
+          <a:xfrm>
+            <a:off x="1093809" y="1617911"/>
+            <a:ext cx="5321833" cy="5176428"/>
+          </a:xfrm>
+          <a:prstGeom prst="rect">
+            <a:avLst/>
+          </a:prstGeom>
+        </p:spPr>
+      </p:pic>
+      <p:pic>
+        <p:nvPicPr>
+          <p:cNvPr id="9" name="Picture 8"/>
+          <p:cNvPicPr>
+            <a:picLocks noChangeAspect="1"/>
+          </p:cNvPicPr>
+          <p:nvPr/>
+        </p:nvPicPr>
+        <p:blipFill rotWithShape="1">
+          <a:blip r:embed="rId4">
+            <a:extLst>
+              <a:ext uri="{28A0092B-C50C-407E-A947-70E740481C1C}">
+                <a14:useLocalDpi xmlns:a14="http://schemas.microsoft.com/office/drawing/2010/main" val="0"/>
+              </a:ext>
+            </a:extLst>
+          </a:blip>
+          <a:srcRect b="1388"/>
+          <a:stretch/>
+        </p:blipFill>
+        <p:spPr>
+          <a:xfrm>
+            <a:off x="7384638" y="1617911"/>
+            <a:ext cx="5244651" cy="5240089"/>
+          </a:xfrm>
+          <a:prstGeom prst="rect">
+            <a:avLst/>
+          </a:prstGeom>
+        </p:spPr>
+      </p:pic>
     </p:spTree>
     <p:extLst>
       <p:ext uri="{BB962C8B-B14F-4D97-AF65-F5344CB8AC3E}">
@@ -6138,13 +6250,270 @@
   <p:clrMapOvr>
     <a:masterClrMapping/>
   </p:clrMapOvr>
-  <p:timing>
-    <p:tnLst>
-      <p:par>
-        <p:cTn id="1" dur="indefinite" restart="never" nodeType="tmRoot"/>
-      </p:par>
-    </p:tnLst>
-  </p:timing>
+</p:sld>
+</file>
+
+<file path=ppt/slides/slide9.xml><?xml version="1.0" encoding="utf-8"?>
+<p:sld xmlns:a="http://schemas.openxmlformats.org/drawingml/2006/main" xmlns:r="http://schemas.openxmlformats.org/officeDocument/2006/relationships" xmlns:p="http://schemas.openxmlformats.org/presentationml/2006/main">
+  <p:cSld>
+    <p:spTree>
+      <p:nvGrpSpPr>
+        <p:cNvPr id="1" name=""/>
+        <p:cNvGrpSpPr/>
+        <p:nvPr/>
+      </p:nvGrpSpPr>
+      <p:grpSpPr>
+        <a:xfrm>
+          <a:off x="0" y="0"/>
+          <a:ext cx="0" cy="0"/>
+          <a:chOff x="0" y="0"/>
+          <a:chExt cx="0" cy="0"/>
+        </a:xfrm>
+      </p:grpSpPr>
+      <p:sp>
+        <p:nvSpPr>
+          <p:cNvPr id="4" name="Rectangle 3"/>
+          <p:cNvSpPr/>
+          <p:nvPr/>
+        </p:nvSpPr>
+        <p:spPr>
+          <a:xfrm>
+            <a:off x="-1" y="824752"/>
+            <a:ext cx="13536613" cy="106353"/>
+          </a:xfrm>
+          <a:prstGeom prst="rect">
+            <a:avLst/>
+          </a:prstGeom>
+          <a:solidFill>
+            <a:srgbClr val="33CCCC"/>
+          </a:solidFill>
+          <a:ln>
+            <a:noFill/>
+          </a:ln>
+        </p:spPr>
+        <p:style>
+          <a:lnRef idx="2">
+            <a:schemeClr val="accent1">
+              <a:shade val="50000"/>
+            </a:schemeClr>
+          </a:lnRef>
+          <a:fillRef idx="1">
+            <a:schemeClr val="accent1"/>
+          </a:fillRef>
+          <a:effectRef idx="0">
+            <a:schemeClr val="accent1"/>
+          </a:effectRef>
+          <a:fontRef idx="minor">
+            <a:schemeClr val="lt1"/>
+          </a:fontRef>
+        </p:style>
+        <p:txBody>
+          <a:bodyPr rtlCol="0" anchor="ctr"/>
+          <a:lstStyle/>
+          <a:p>
+            <a:pPr algn="ctr"/>
+            <a:endParaRPr lang="bg-BG"/>
+          </a:p>
+        </p:txBody>
+      </p:sp>
+      <p:pic>
+        <p:nvPicPr>
+          <p:cNvPr id="5" name="Picture 4"/>
+          <p:cNvPicPr>
+            <a:picLocks noChangeAspect="1"/>
+          </p:cNvPicPr>
+          <p:nvPr/>
+        </p:nvPicPr>
+        <p:blipFill>
+          <a:blip r:embed="rId2">
+            <a:extLst>
+              <a:ext uri="{28A0092B-C50C-407E-A947-70E740481C1C}">
+                <a14:useLocalDpi xmlns:a14="http://schemas.microsoft.com/office/drawing/2010/main" val="0"/>
+              </a:ext>
+            </a:extLst>
+          </a:blip>
+          <a:stretch>
+            <a:fillRect/>
+          </a:stretch>
+        </p:blipFill>
+        <p:spPr>
+          <a:xfrm>
+            <a:off x="670302" y="57538"/>
+            <a:ext cx="2404591" cy="1640779"/>
+          </a:xfrm>
+          <a:prstGeom prst="rect">
+            <a:avLst/>
+          </a:prstGeom>
+        </p:spPr>
+      </p:pic>
+      <p:sp>
+        <p:nvSpPr>
+          <p:cNvPr id="3" name="TextBox 2"/>
+          <p:cNvSpPr txBox="1"/>
+          <p:nvPr/>
+        </p:nvSpPr>
+        <p:spPr>
+          <a:xfrm>
+            <a:off x="3074893" y="81256"/>
+            <a:ext cx="10199147" cy="769441"/>
+          </a:xfrm>
+          <a:prstGeom prst="rect">
+            <a:avLst/>
+          </a:prstGeom>
+          <a:noFill/>
+        </p:spPr>
+        <p:txBody>
+          <a:bodyPr wrap="square" rtlCol="0">
+            <a:spAutoFit/>
+          </a:bodyPr>
+          <a:lstStyle/>
+          <a:p>
+            <a:r>
+              <a:rPr lang="en-US" sz="4400" b="1" dirty="0">
+                <a:latin typeface="Arial" panose="020B0604020202020204" pitchFamily="34" charset="0"/>
+                <a:cs typeface="Arial" panose="020B0604020202020204" pitchFamily="34" charset="0"/>
+              </a:rPr>
+              <a:t>Results </a:t>
+            </a:r>
+            <a:r>
+              <a:rPr lang="en-US" sz="4400" dirty="0">
+                <a:latin typeface="Arial" panose="020B0604020202020204" pitchFamily="34" charset="0"/>
+                <a:cs typeface="Arial" panose="020B0604020202020204" pitchFamily="34" charset="0"/>
+              </a:rPr>
+              <a:t>– what does it all mean?</a:t>
+            </a:r>
+            <a:endParaRPr lang="bg-BG" sz="4400" dirty="0">
+              <a:latin typeface="Arial" panose="020B0604020202020204" pitchFamily="34" charset="0"/>
+              <a:cs typeface="Arial" panose="020B0604020202020204" pitchFamily="34" charset="0"/>
+            </a:endParaRPr>
+          </a:p>
+        </p:txBody>
+      </p:sp>
+      <p:sp>
+        <p:nvSpPr>
+          <p:cNvPr id="10" name="TextBox 9"/>
+          <p:cNvSpPr txBox="1"/>
+          <p:nvPr/>
+        </p:nvSpPr>
+        <p:spPr>
+          <a:xfrm>
+            <a:off x="1121714" y="5940832"/>
+            <a:ext cx="10260956" cy="646331"/>
+          </a:xfrm>
+          <a:prstGeom prst="rect">
+            <a:avLst/>
+          </a:prstGeom>
+          <a:noFill/>
+        </p:spPr>
+        <p:txBody>
+          <a:bodyPr wrap="square" rtlCol="0">
+            <a:spAutoFit/>
+          </a:bodyPr>
+          <a:lstStyle/>
+          <a:p>
+            <a:r>
+              <a:rPr lang="en-GB" dirty="0" err="1"/>
+              <a:t>Barve</a:t>
+            </a:r>
+            <a:r>
+              <a:rPr lang="en-GB" dirty="0"/>
+              <a:t> V. (2014). Discovering and developing primary biodiversity data from social networking sites: A novel approach, </a:t>
+            </a:r>
+            <a:r>
+              <a:rPr lang="en-GB" i="1" dirty="0"/>
+              <a:t>Ecological Informatics, 24</a:t>
+            </a:r>
+            <a:r>
+              <a:rPr lang="en-GB" dirty="0"/>
+              <a:t> 194-199. DOI: </a:t>
+            </a:r>
+            <a:r>
+              <a:rPr lang="en-GB" dirty="0">
+                <a:hlinkClick r:id="rId3"/>
+              </a:rPr>
+              <a:t>http://dx.doi.org/10.1016/j.ecoinf.2014.08.008</a:t>
+            </a:r>
+            <a:endParaRPr lang="en-GB" dirty="0"/>
+          </a:p>
+        </p:txBody>
+      </p:sp>
+      <p:sp>
+        <p:nvSpPr>
+          <p:cNvPr id="2" name="TextBox 1"/>
+          <p:cNvSpPr txBox="1"/>
+          <p:nvPr/>
+        </p:nvSpPr>
+        <p:spPr>
+          <a:xfrm>
+            <a:off x="1121713" y="2320279"/>
+            <a:ext cx="9451759" cy="2554545"/>
+          </a:xfrm>
+          <a:prstGeom prst="rect">
+            <a:avLst/>
+          </a:prstGeom>
+          <a:noFill/>
+        </p:spPr>
+        <p:txBody>
+          <a:bodyPr wrap="square" rtlCol="0">
+            <a:spAutoFit/>
+          </a:bodyPr>
+          <a:lstStyle/>
+          <a:p>
+            <a:pPr marL="285750" indent="-285750">
+              <a:buFont typeface="Arial" panose="020B0604020202020204" pitchFamily="34" charset="0"/>
+              <a:buChar char="•"/>
+            </a:pPr>
+            <a:r>
+              <a:rPr lang="en-GB" sz="3200" dirty="0"/>
+              <a:t>Temporal and spatial dynamics</a:t>
+            </a:r>
+          </a:p>
+          <a:p>
+            <a:pPr marL="285750" indent="-285750">
+              <a:buFont typeface="Arial" panose="020B0604020202020204" pitchFamily="34" charset="0"/>
+              <a:buChar char="•"/>
+            </a:pPr>
+            <a:endParaRPr lang="en-GB" sz="3200" dirty="0"/>
+          </a:p>
+          <a:p>
+            <a:pPr marL="285750" indent="-285750">
+              <a:buFont typeface="Arial" panose="020B0604020202020204" pitchFamily="34" charset="0"/>
+              <a:buChar char="•"/>
+            </a:pPr>
+            <a:r>
+              <a:rPr lang="en-GB" sz="3200" dirty="0"/>
+              <a:t>Social media and GBIF can complement each other</a:t>
+            </a:r>
+          </a:p>
+          <a:p>
+            <a:pPr marL="285750" indent="-285750">
+              <a:buFont typeface="Arial" panose="020B0604020202020204" pitchFamily="34" charset="0"/>
+              <a:buChar char="•"/>
+            </a:pPr>
+            <a:endParaRPr lang="en-GB" sz="3200" dirty="0"/>
+          </a:p>
+          <a:p>
+            <a:pPr marL="285750" indent="-285750">
+              <a:buFont typeface="Arial" panose="020B0604020202020204" pitchFamily="34" charset="0"/>
+              <a:buChar char="•"/>
+            </a:pPr>
+            <a:r>
+              <a:rPr lang="en-GB" sz="3200" dirty="0"/>
+              <a:t>Need for open data!</a:t>
+            </a:r>
+          </a:p>
+        </p:txBody>
+      </p:sp>
+    </p:spTree>
+    <p:extLst>
+      <p:ext uri="{BB962C8B-B14F-4D97-AF65-F5344CB8AC3E}">
+        <p14:creationId xmlns:p14="http://schemas.microsoft.com/office/powerpoint/2010/main" val="4229072734"/>
+      </p:ext>
+    </p:extLst>
+  </p:cSld>
+  <p:clrMapOvr>
+    <a:masterClrMapping/>
+  </p:clrMapOvr>
 </p:sld>
 </file>
 

</xml_diff>